<commit_message>
feat: Updated version: support for font rendering calculation
</commit_message>
<xml_diff>
--- a/msoffice/pptx/samples/template_single.pptx
+++ b/msoffice/pptx/samples/template_single.pptx
@@ -2871,7 +2871,7 @@
               <a:rPr lang="en-US" smtClean="0">
                 <a:latin typeface="Segoe UI" pitchFamily="34" charset="0"/>
               </a:rPr>
-              <a:t>2025/12/11 21:48</a:t>
+              <a:t>2025/12/12 13:31</a:t>
             </a:fld>
             <a:endParaRPr lang="en-US">
               <a:latin typeface="Segoe UI" pitchFamily="34" charset="0"/>
@@ -3065,7 +3065,7 @@
           <a:p>
             <a:fld id="{2498908C-44C1-417D-9628-8E7468EC4641}" type="datetime8">
               <a:rPr lang="en-US" smtClean="0"/>
-              <a:t>2025/12/11 21:48</a:t>
+              <a:t>2025/12/12 13:31</a:t>
             </a:fld>
             <a:endParaRPr lang="en-US"/>
           </a:p>
@@ -3410,7 +3410,7 @@
           <a:p>
             <a:fld id="{2498908C-44C1-417D-9628-8E7468EC4641}" type="datetime8">
               <a:rPr lang="en-US" smtClean="0"/>
-              <a:t>2025/12/11 21:52</a:t>
+              <a:t>2025/12/12 13:31</a:t>
             </a:fld>
             <a:endParaRPr lang="en-US"/>
           </a:p>
@@ -3537,7 +3537,7 @@
           <a:p>
             <a:fld id="{2498908C-44C1-417D-9628-8E7468EC4641}" type="datetime8">
               <a:rPr lang="en-US" smtClean="0"/>
-              <a:t>2025/12/11 21:48</a:t>
+              <a:t>2025/12/12 13:31</a:t>
             </a:fld>
             <a:endParaRPr lang="en-US"/>
           </a:p>
@@ -3663,30 +3663,60 @@
           </a:bodyPr>
           <a:lstStyle>
             <a:lvl1pPr>
+              <a:lnSpc>
+                <a:spcPct val="100000"/>
+              </a:lnSpc>
+              <a:spcBef>
+                <a:spcPts val="0"/>
+              </a:spcBef>
               <a:spcAft>
                 <a:spcPts val="800"/>
               </a:spcAft>
               <a:defRPr/>
             </a:lvl1pPr>
             <a:lvl2pPr>
+              <a:lnSpc>
+                <a:spcPct val="100000"/>
+              </a:lnSpc>
+              <a:spcBef>
+                <a:spcPts val="0"/>
+              </a:spcBef>
               <a:spcAft>
                 <a:spcPts val="800"/>
               </a:spcAft>
               <a:defRPr/>
             </a:lvl2pPr>
             <a:lvl3pPr>
+              <a:lnSpc>
+                <a:spcPct val="100000"/>
+              </a:lnSpc>
+              <a:spcBef>
+                <a:spcPts val="0"/>
+              </a:spcBef>
               <a:spcAft>
                 <a:spcPts val="800"/>
               </a:spcAft>
               <a:defRPr/>
             </a:lvl3pPr>
             <a:lvl4pPr>
+              <a:lnSpc>
+                <a:spcPct val="100000"/>
+              </a:lnSpc>
+              <a:spcBef>
+                <a:spcPts val="0"/>
+              </a:spcBef>
               <a:spcAft>
                 <a:spcPts val="800"/>
               </a:spcAft>
               <a:defRPr/>
             </a:lvl4pPr>
             <a:lvl5pPr>
+              <a:lnSpc>
+                <a:spcPct val="100000"/>
+              </a:lnSpc>
+              <a:spcBef>
+                <a:spcPts val="0"/>
+              </a:spcBef>
               <a:spcAft>
                 <a:spcPts val="800"/>
               </a:spcAft>
@@ -11753,10 +11783,10 @@
       </p:grpSpPr>
       <p:sp>
         <p:nvSpPr>
-          <p:cNvPr id="10" name="Note">
+          <p:cNvPr id="5" name="Note">
             <a:extLst>
               <a:ext uri="{FF2B5EF4-FFF2-40B4-BE49-F238E27FC236}">
-                <a16:creationId xmlns:a16="http://schemas.microsoft.com/office/drawing/2014/main" id="{B1A00EB8-014F-A456-6A21-7C59CD1EFF58}"/>
+                <a16:creationId xmlns:a16="http://schemas.microsoft.com/office/drawing/2014/main" id="{F1B53C7F-18E6-F794-BA19-F98B8B1F2511}"/>
               </a:ext>
             </a:extLst>
           </p:cNvPr>
@@ -11772,16 +11802,16 @@
           <a:bodyPr/>
           <a:lstStyle/>
           <a:p>
-            <a:endParaRPr lang="ja-JP" noProof="0" dirty="0"/>
+            <a:endParaRPr lang="ja-JP" altLang="en-US"/>
           </a:p>
         </p:txBody>
       </p:sp>
       <p:sp>
         <p:nvSpPr>
-          <p:cNvPr id="9" name="Insights">
+          <p:cNvPr id="4" name="Insights">
             <a:extLst>
               <a:ext uri="{FF2B5EF4-FFF2-40B4-BE49-F238E27FC236}">
-                <a16:creationId xmlns:a16="http://schemas.microsoft.com/office/drawing/2014/main" id="{52462E50-3609-6E58-744E-322182332833}"/>
+                <a16:creationId xmlns:a16="http://schemas.microsoft.com/office/drawing/2014/main" id="{C3BA1B81-3318-2A40-164A-D422AA6567EF}"/>
               </a:ext>
             </a:extLst>
           </p:cNvPr>
@@ -11797,16 +11827,16 @@
           <a:bodyPr/>
           <a:lstStyle/>
           <a:p>
-            <a:endParaRPr lang="ja-JP" noProof="0" dirty="0"/>
+            <a:endParaRPr lang="ja-JP" altLang="en-US" dirty="0"/>
           </a:p>
         </p:txBody>
       </p:sp>
       <p:sp>
         <p:nvSpPr>
-          <p:cNvPr id="8" name="GraphImage">
+          <p:cNvPr id="3" name="GraphImage">
             <a:extLst>
               <a:ext uri="{FF2B5EF4-FFF2-40B4-BE49-F238E27FC236}">
-                <a16:creationId xmlns:a16="http://schemas.microsoft.com/office/drawing/2014/main" id="{F561C03C-3FEF-DFA4-CEC6-2E144394141C}"/>
+                <a16:creationId xmlns:a16="http://schemas.microsoft.com/office/drawing/2014/main" id="{94CEDD40-4771-A3BD-9F34-572F140B5C84}"/>
               </a:ext>
             </a:extLst>
           </p:cNvPr>
@@ -11822,16 +11852,16 @@
           <a:bodyPr/>
           <a:lstStyle/>
           <a:p>
-            <a:endParaRPr lang="ja-JP" noProof="0" dirty="0"/>
+            <a:endParaRPr lang="ja-JP" altLang="en-US"/>
           </a:p>
         </p:txBody>
       </p:sp>
       <p:sp>
         <p:nvSpPr>
-          <p:cNvPr id="7" name="Title">
+          <p:cNvPr id="2" name="Title">
             <a:extLst>
               <a:ext uri="{FF2B5EF4-FFF2-40B4-BE49-F238E27FC236}">
-                <a16:creationId xmlns:a16="http://schemas.microsoft.com/office/drawing/2014/main" id="{E404F151-ACEF-B65F-2145-0565FF6919FF}"/>
+                <a16:creationId xmlns:a16="http://schemas.microsoft.com/office/drawing/2014/main" id="{D0B85291-9520-9F3B-7FC4-9F4245C372D5}"/>
               </a:ext>
             </a:extLst>
           </p:cNvPr>
@@ -11847,7 +11877,7 @@
           <a:bodyPr/>
           <a:lstStyle/>
           <a:p>
-            <a:endParaRPr lang="ja-JP" noProof="0" dirty="0"/>
+            <a:endParaRPr lang="ja-JP" altLang="en-US"/>
           </a:p>
         </p:txBody>
       </p:sp>
@@ -11949,7 +11979,7 @@
         </p:spPr>
         <p:txBody>
           <a:bodyPr>
-            <a:normAutofit fontScale="85000" lnSpcReduction="10000"/>
+            <a:normAutofit fontScale="92500" lnSpcReduction="20000"/>
           </a:bodyPr>
           <a:lstStyle/>
           <a:p>
@@ -11959,7 +11989,15 @@
             </a:r>
             <a:r>
               <a:rPr lang="ja-JP" noProof="0" dirty="0"/>
-              <a:t>：パンデミック以前から右肩下がり。アプリ配車 (Uber/Lyft等) への需要シフトが背景</a:t>
+              <a:t>：パンデミック以前から右肩下がり</a:t>
+            </a:r>
+            <a:r>
+              <a:rPr lang="ja-JP" altLang="en-US" dirty="0"/>
+              <a:t>、</a:t>
+            </a:r>
+            <a:r>
+              <a:rPr lang="ja-JP" noProof="0" dirty="0"/>
+              <a:t>アプリ配車 (Uber/Lyft等) への需要シフトが背景</a:t>
             </a:r>
           </a:p>
           <a:p>
@@ -11979,7 +12017,15 @@
             </a:r>
             <a:r>
               <a:rPr lang="ja-JP" noProof="0" dirty="0"/>
-              <a:t>：繁忙期の波が縮小。公共交通・マイクロモビリティ・配車プラットフォームへの分散が影響</a:t>
+              <a:t>：繁忙期の波が縮小</a:t>
+            </a:r>
+            <a:r>
+              <a:rPr lang="ja-JP" altLang="en-US" noProof="0" dirty="0"/>
+              <a:t>、</a:t>
+            </a:r>
+            <a:r>
+              <a:rPr lang="ja-JP" noProof="0" dirty="0"/>
+              <a:t>公共交通・マイクロモビリティ・配車プラットフォームへの分散が影響</a:t>
             </a:r>
           </a:p>
         </p:txBody>
@@ -13324,15 +13370,6 @@
 </file>
 
 <file path=customXml/item2.xml><?xml version="1.0" encoding="utf-8"?>
-<?mso-contentType ?>
-<FormTemplates xmlns="http://schemas.microsoft.com/sharepoint/v3/contenttype/forms">
-  <Display>DocumentLibraryForm</Display>
-  <Edit>DocumentLibraryForm</Edit>
-  <New>DocumentLibraryForm</New>
-</FormTemplates>
-</file>
-
-<file path=customXml/item3.xml><?xml version="1.0" encoding="utf-8"?>
 <ct:contentTypeSchema xmlns:ct="http://schemas.microsoft.com/office/2006/metadata/contentType" xmlns:ma="http://schemas.microsoft.com/office/2006/metadata/properties/metaAttributes" ct:_="" ma:_="" ma:contentTypeName="Document" ma:contentTypeID="0x010100D86D235E0236944CB2D0154C00AD9253" ma:contentTypeVersion="27" ma:contentTypeDescription="Create a new document." ma:contentTypeScope="" ma:versionID="b652f670b999dfd2a7fe8a4f260222d7">
   <xsd:schema xmlns:xsd="http://www.w3.org/2001/XMLSchema" xmlns:xs="http://www.w3.org/2001/XMLSchema" xmlns:p="http://schemas.microsoft.com/office/2006/metadata/properties" xmlns:ns1="http://schemas.microsoft.com/sharepoint/v3" xmlns:ns2="07c5dfa0-33a3-47dd-bfb7-87fb96739115" xmlns:ns3="b1c3d6fc-5689-40cc-899d-3b916b4ff5bf" xmlns:ns4="230e9df3-be65-4c73-a93b-d1236ebd677e" targetNamespace="http://schemas.microsoft.com/office/2006/metadata/properties" ma:root="true" ma:fieldsID="0aeaa046ab8da671f0e3dacef0a636a1" ns1:_="" ns2:_="" ns3:_="" ns4:_="">
     <xsd:import namespace="http://schemas.microsoft.com/sharepoint/v3"/>
@@ -13641,6 +13678,15 @@
 </ct:contentTypeSchema>
 </file>
 
+<file path=customXml/item3.xml><?xml version="1.0" encoding="utf-8"?>
+<?mso-contentType ?>
+<FormTemplates xmlns="http://schemas.microsoft.com/sharepoint/v3/contenttype/forms">
+  <Display>DocumentLibraryForm</Display>
+  <Edit>DocumentLibraryForm</Edit>
+  <New>DocumentLibraryForm</New>
+</FormTemplates>
+</file>
+
 <file path=customXml/itemProps1.xml><?xml version="1.0" encoding="utf-8"?>
 <ds:datastoreItem xmlns:ds="http://schemas.openxmlformats.org/officeDocument/2006/customXml" ds:itemID="{F990F116-B58F-4255-B05B-DA3808E0E5C6}">
   <ds:schemaRefs>
@@ -13663,14 +13709,6 @@
 </file>
 
 <file path=customXml/itemProps2.xml><?xml version="1.0" encoding="utf-8"?>
-<ds:datastoreItem xmlns:ds="http://schemas.openxmlformats.org/officeDocument/2006/customXml" ds:itemID="{758FDAC0-319D-4A54-8D8E-1D42CB1F8004}">
-  <ds:schemaRefs>
-    <ds:schemaRef ds:uri="http://schemas.microsoft.com/sharepoint/v3/contenttype/forms"/>
-  </ds:schemaRefs>
-</ds:datastoreItem>
-</file>
-
-<file path=customXml/itemProps3.xml><?xml version="1.0" encoding="utf-8"?>
 <ds:datastoreItem xmlns:ds="http://schemas.openxmlformats.org/officeDocument/2006/customXml" ds:itemID="{2A084E1F-7235-4F66-BAA2-93C4F008F190}">
   <ds:schemaRefs>
     <ds:schemaRef ds:uri="07c5dfa0-33a3-47dd-bfb7-87fb96739115"/>
@@ -13691,6 +13729,14 @@
 </ds:datastoreItem>
 </file>
 
+<file path=customXml/itemProps3.xml><?xml version="1.0" encoding="utf-8"?>
+<ds:datastoreItem xmlns:ds="http://schemas.openxmlformats.org/officeDocument/2006/customXml" ds:itemID="{758FDAC0-319D-4A54-8D8E-1D42CB1F8004}">
+  <ds:schemaRefs>
+    <ds:schemaRef ds:uri="http://schemas.microsoft.com/sharepoint/v3/contenttype/forms"/>
+  </ds:schemaRefs>
+</ds:datastoreItem>
+</file>
+
 <file path=docMetadata/LabelInfo.xml><?xml version="1.0" encoding="utf-8"?>
 <clbl:labelList xmlns:clbl="http://schemas.microsoft.com/office/2020/mipLabelMetadata">
   <clbl:label id="{f42aa342-8706-4288-bd11-ebb85995028c}" enabled="1" method="Privileged" siteId="{72f988bf-86f1-41af-91ab-2d7cd011db47}" removed="0"/>

</xml_diff>